<commit_message>
Entregable 1 y Avance de la planeacion
Primera entrega del entregable 1 y avance del documento de planeacion.
</commit_message>
<xml_diff>
--- a/Entregable 1/interfaces.pptx
+++ b/Entregable 1/interfaces.pptx
@@ -3512,7 +3512,19 @@
               <a:rPr lang="es-MX" sz="3200" i="1" dirty="0" smtClean="0">
                 <a:latin typeface="Montserrat" panose="00000500000000000000" pitchFamily="2" charset="0"/>
               </a:rPr>
-              <a:t>“Tus platillos favoritos a un tap de distancia”</a:t>
+              <a:t>“Tus platillos favoritos a un </a:t>
+            </a:r>
+            <a:r>
+              <a:rPr lang="es-MX" sz="3200" i="1" dirty="0" smtClean="0">
+                <a:latin typeface="Montserrat" panose="00000500000000000000" pitchFamily="2" charset="0"/>
+              </a:rPr>
+              <a:t>tab </a:t>
+            </a:r>
+            <a:r>
+              <a:rPr lang="es-MX" sz="3200" i="1" dirty="0" smtClean="0">
+                <a:latin typeface="Montserrat" panose="00000500000000000000" pitchFamily="2" charset="0"/>
+              </a:rPr>
+              <a:t>de distancia”</a:t>
             </a:r>
             <a:endParaRPr lang="es-MX" sz="3200" i="1" dirty="0">
               <a:latin typeface="Montserrat" panose="00000500000000000000" pitchFamily="2" charset="0"/>
@@ -5592,7 +5604,7 @@
         </p:nvSpPr>
         <p:spPr>
           <a:xfrm>
-            <a:off x="413238" y="1485900"/>
+            <a:off x="447973" y="1485320"/>
             <a:ext cx="3508998" cy="1802423"/>
           </a:xfrm>
           <a:prstGeom prst="rect">
@@ -5623,7 +5635,7 @@
         </p:nvSpPr>
         <p:spPr>
           <a:xfrm>
-            <a:off x="390254" y="3485042"/>
+            <a:off x="447973" y="3501529"/>
             <a:ext cx="3508998" cy="1802423"/>
           </a:xfrm>
           <a:prstGeom prst="rect">
@@ -5642,6 +5654,67 @@
           </a:bodyPr>
           <a:lstStyle/>
           <a:p>
+            <a:endParaRPr lang="es-MX" dirty="0"/>
+          </a:p>
+        </p:txBody>
+      </p:sp>
+      <p:sp>
+        <p:nvSpPr>
+          <p:cNvPr id="6" name="CuadroTexto 5"/>
+          <p:cNvSpPr txBox="1"/>
+          <p:nvPr/>
+        </p:nvSpPr>
+        <p:spPr>
+          <a:xfrm>
+            <a:off x="924382" y="1751487"/>
+            <a:ext cx="2622591" cy="369332"/>
+          </a:xfrm>
+          <a:prstGeom prst="rect">
+            <a:avLst/>
+          </a:prstGeom>
+          <a:noFill/>
+        </p:spPr>
+        <p:txBody>
+          <a:bodyPr wrap="square" rtlCol="0">
+            <a:spAutoFit/>
+          </a:bodyPr>
+          <a:lstStyle/>
+          <a:p>
+            <a:r>
+              <a:rPr lang="es-MX" dirty="0" smtClean="0"/>
+              <a:t>[FOTO DEL RESTAURANTE]</a:t>
+            </a:r>
+            <a:endParaRPr lang="es-MX" dirty="0"/>
+          </a:p>
+        </p:txBody>
+      </p:sp>
+      <p:sp>
+        <p:nvSpPr>
+          <p:cNvPr id="21" name="CuadroTexto 20"/>
+          <p:cNvSpPr txBox="1"/>
+          <p:nvPr/>
+        </p:nvSpPr>
+        <p:spPr>
+          <a:xfrm>
+            <a:off x="447973" y="2641412"/>
+            <a:ext cx="3178898" cy="646331"/>
+          </a:xfrm>
+          <a:prstGeom prst="rect">
+            <a:avLst/>
+          </a:prstGeom>
+          <a:noFill/>
+        </p:spPr>
+        <p:txBody>
+          <a:bodyPr wrap="square" rtlCol="0">
+            <a:spAutoFit/>
+          </a:bodyPr>
+          <a:lstStyle/>
+          <a:p>
+            <a:pPr algn="ctr"/>
+            <a:r>
+              <a:rPr lang="es-MX" dirty="0" smtClean="0"/>
+              <a:t>[ESTADO], DISTANCIA, MINIMO DE COMPRA</a:t>
+            </a:r>
             <a:endParaRPr lang="es-MX" dirty="0"/>
           </a:p>
         </p:txBody>

</xml_diff>